<commit_message>
Buetooth and Batter status symbol added
Inlcuded icon for bluetooth and batter status.
</commit_message>
<xml_diff>
--- a/PythonController/icons.pptx
+++ b/PythonController/icons.pptx
@@ -9,6 +9,8 @@
     <p:sldId id="257" r:id="rId3"/>
     <p:sldId id="258" r:id="rId4"/>
     <p:sldId id="259" r:id="rId5"/>
+    <p:sldId id="260" r:id="rId6"/>
+    <p:sldId id="261" r:id="rId7"/>
   </p:sldIdLst>
   <p:sldSz cx="9144000" cy="6858000" type="screen4x3"/>
   <p:notesSz cx="6858000" cy="9144000"/>
@@ -291,7 +293,7 @@
           <a:p>
             <a:fld id="{2DCED6EC-74D1-4869-862B-B0EA880B70BD}" type="datetimeFigureOut">
               <a:rPr lang="en-AU" smtClean="0"/>
-              <a:t>22/10/2016</a:t>
+              <a:t>26/11/2016</a:t>
             </a:fld>
             <a:endParaRPr lang="en-AU"/>
           </a:p>
@@ -461,7 +463,7 @@
           <a:p>
             <a:fld id="{2DCED6EC-74D1-4869-862B-B0EA880B70BD}" type="datetimeFigureOut">
               <a:rPr lang="en-AU" smtClean="0"/>
-              <a:t>22/10/2016</a:t>
+              <a:t>26/11/2016</a:t>
             </a:fld>
             <a:endParaRPr lang="en-AU"/>
           </a:p>
@@ -641,7 +643,7 @@
           <a:p>
             <a:fld id="{2DCED6EC-74D1-4869-862B-B0EA880B70BD}" type="datetimeFigureOut">
               <a:rPr lang="en-AU" smtClean="0"/>
-              <a:t>22/10/2016</a:t>
+              <a:t>26/11/2016</a:t>
             </a:fld>
             <a:endParaRPr lang="en-AU"/>
           </a:p>
@@ -811,7 +813,7 @@
           <a:p>
             <a:fld id="{2DCED6EC-74D1-4869-862B-B0EA880B70BD}" type="datetimeFigureOut">
               <a:rPr lang="en-AU" smtClean="0"/>
-              <a:t>22/10/2016</a:t>
+              <a:t>26/11/2016</a:t>
             </a:fld>
             <a:endParaRPr lang="en-AU"/>
           </a:p>
@@ -1057,7 +1059,7 @@
           <a:p>
             <a:fld id="{2DCED6EC-74D1-4869-862B-B0EA880B70BD}" type="datetimeFigureOut">
               <a:rPr lang="en-AU" smtClean="0"/>
-              <a:t>22/10/2016</a:t>
+              <a:t>26/11/2016</a:t>
             </a:fld>
             <a:endParaRPr lang="en-AU"/>
           </a:p>
@@ -1345,7 +1347,7 @@
           <a:p>
             <a:fld id="{2DCED6EC-74D1-4869-862B-B0EA880B70BD}" type="datetimeFigureOut">
               <a:rPr lang="en-AU" smtClean="0"/>
-              <a:t>22/10/2016</a:t>
+              <a:t>26/11/2016</a:t>
             </a:fld>
             <a:endParaRPr lang="en-AU"/>
           </a:p>
@@ -1767,7 +1769,7 @@
           <a:p>
             <a:fld id="{2DCED6EC-74D1-4869-862B-B0EA880B70BD}" type="datetimeFigureOut">
               <a:rPr lang="en-AU" smtClean="0"/>
-              <a:t>22/10/2016</a:t>
+              <a:t>26/11/2016</a:t>
             </a:fld>
             <a:endParaRPr lang="en-AU"/>
           </a:p>
@@ -1885,7 +1887,7 @@
           <a:p>
             <a:fld id="{2DCED6EC-74D1-4869-862B-B0EA880B70BD}" type="datetimeFigureOut">
               <a:rPr lang="en-AU" smtClean="0"/>
-              <a:t>22/10/2016</a:t>
+              <a:t>26/11/2016</a:t>
             </a:fld>
             <a:endParaRPr lang="en-AU"/>
           </a:p>
@@ -1980,7 +1982,7 @@
           <a:p>
             <a:fld id="{2DCED6EC-74D1-4869-862B-B0EA880B70BD}" type="datetimeFigureOut">
               <a:rPr lang="en-AU" smtClean="0"/>
-              <a:t>22/10/2016</a:t>
+              <a:t>26/11/2016</a:t>
             </a:fld>
             <a:endParaRPr lang="en-AU"/>
           </a:p>
@@ -2257,7 +2259,7 @@
           <a:p>
             <a:fld id="{2DCED6EC-74D1-4869-862B-B0EA880B70BD}" type="datetimeFigureOut">
               <a:rPr lang="en-AU" smtClean="0"/>
-              <a:t>22/10/2016</a:t>
+              <a:t>26/11/2016</a:t>
             </a:fld>
             <a:endParaRPr lang="en-AU"/>
           </a:p>
@@ -2510,7 +2512,7 @@
           <a:p>
             <a:fld id="{2DCED6EC-74D1-4869-862B-B0EA880B70BD}" type="datetimeFigureOut">
               <a:rPr lang="en-AU" smtClean="0"/>
-              <a:t>22/10/2016</a:t>
+              <a:t>26/11/2016</a:t>
             </a:fld>
             <a:endParaRPr lang="en-AU"/>
           </a:p>
@@ -2723,7 +2725,7 @@
           <a:p>
             <a:fld id="{2DCED6EC-74D1-4869-862B-B0EA880B70BD}" type="datetimeFigureOut">
               <a:rPr lang="en-AU" smtClean="0"/>
-              <a:t>22/10/2016</a:t>
+              <a:t>26/11/2016</a:t>
             </a:fld>
             <a:endParaRPr lang="en-AU"/>
           </a:p>
@@ -3591,6 +3593,249 @@
 </p:sld>
 </file>
 
+<file path=ppt/slides/slide5.xml><?xml version="1.0" encoding="utf-8"?>
+<p:sld xmlns:a="http://schemas.openxmlformats.org/drawingml/2006/main" xmlns:r="http://schemas.openxmlformats.org/officeDocument/2006/relationships" xmlns:p="http://schemas.openxmlformats.org/presentationml/2006/main">
+  <p:cSld>
+    <p:spTree>
+      <p:nvGrpSpPr>
+        <p:cNvPr id="1" name=""/>
+        <p:cNvGrpSpPr/>
+        <p:nvPr/>
+      </p:nvGrpSpPr>
+      <p:grpSpPr>
+        <a:xfrm>
+          <a:off x="0" y="0"/>
+          <a:ext cx="0" cy="0"/>
+          <a:chOff x="0" y="0"/>
+          <a:chExt cx="0" cy="0"/>
+        </a:xfrm>
+      </p:grpSpPr>
+      <p:sp>
+        <p:nvSpPr>
+          <p:cNvPr id="2" name="Title 1"/>
+          <p:cNvSpPr>
+            <a:spLocks noGrp="1"/>
+          </p:cNvSpPr>
+          <p:nvPr>
+            <p:ph type="ctrTitle"/>
+          </p:nvPr>
+        </p:nvSpPr>
+        <p:spPr/>
+        <p:txBody>
+          <a:bodyPr/>
+          <a:lstStyle/>
+          <a:p>
+            <a:endParaRPr lang="en-AU"/>
+          </a:p>
+        </p:txBody>
+      </p:sp>
+      <p:sp>
+        <p:nvSpPr>
+          <p:cNvPr id="3" name="Subtitle 2"/>
+          <p:cNvSpPr>
+            <a:spLocks noGrp="1"/>
+          </p:cNvSpPr>
+          <p:nvPr>
+            <p:ph type="subTitle" idx="1"/>
+          </p:nvPr>
+        </p:nvSpPr>
+        <p:spPr/>
+        <p:txBody>
+          <a:bodyPr/>
+          <a:lstStyle/>
+          <a:p>
+            <a:endParaRPr lang="en-AU"/>
+          </a:p>
+        </p:txBody>
+      </p:sp>
+      <p:pic>
+        <p:nvPicPr>
+          <p:cNvPr id="1026" name="Picture 2" descr="Image result for icon bluetooth connection status"/>
+          <p:cNvPicPr>
+            <a:picLocks noChangeAspect="1" noChangeArrowheads="1"/>
+          </p:cNvPicPr>
+          <p:nvPr/>
+        </p:nvPicPr>
+        <p:blipFill>
+          <a:blip r:embed="rId2" cstate="print">
+            <a:extLst>
+              <a:ext uri="{28A0092B-C50C-407E-A947-70E740481C1C}">
+                <a14:useLocalDpi xmlns:a14="http://schemas.microsoft.com/office/drawing/2010/main" val="0"/>
+              </a:ext>
+            </a:extLst>
+          </a:blip>
+          <a:srcRect/>
+          <a:stretch>
+            <a:fillRect/>
+          </a:stretch>
+        </p:blipFill>
+        <p:spPr bwMode="auto">
+          <a:xfrm>
+            <a:off x="2411760" y="1052736"/>
+            <a:ext cx="4272409" cy="4272409"/>
+          </a:xfrm>
+          <a:prstGeom prst="rect">
+            <a:avLst/>
+          </a:prstGeom>
+          <a:noFill/>
+          <a:extLst>
+            <a:ext uri="{909E8E84-426E-40DD-AFC4-6F175D3DCCD1}">
+              <a14:hiddenFill xmlns:a14="http://schemas.microsoft.com/office/drawing/2010/main">
+                <a:solidFill>
+                  <a:srgbClr val="FFFFFF"/>
+                </a:solidFill>
+              </a14:hiddenFill>
+            </a:ext>
+          </a:extLst>
+        </p:spPr>
+      </p:pic>
+    </p:spTree>
+    <p:extLst>
+      <p:ext uri="{BB962C8B-B14F-4D97-AF65-F5344CB8AC3E}">
+        <p14:creationId xmlns:p14="http://schemas.microsoft.com/office/powerpoint/2010/main" val="1051124192"/>
+      </p:ext>
+    </p:extLst>
+  </p:cSld>
+  <p:clrMapOvr>
+    <a:masterClrMapping/>
+  </p:clrMapOvr>
+  <p:timing>
+    <p:tnLst>
+      <p:par>
+        <p:cTn id="1" dur="indefinite" restart="never" nodeType="tmRoot"/>
+      </p:par>
+    </p:tnLst>
+  </p:timing>
+</p:sld>
+</file>
+
+<file path=ppt/slides/slide6.xml><?xml version="1.0" encoding="utf-8"?>
+<p:sld xmlns:a="http://schemas.openxmlformats.org/drawingml/2006/main" xmlns:r="http://schemas.openxmlformats.org/officeDocument/2006/relationships" xmlns:p="http://schemas.openxmlformats.org/presentationml/2006/main">
+  <p:cSld>
+    <p:spTree>
+      <p:nvGrpSpPr>
+        <p:cNvPr id="1" name=""/>
+        <p:cNvGrpSpPr/>
+        <p:nvPr/>
+      </p:nvGrpSpPr>
+      <p:grpSpPr>
+        <a:xfrm>
+          <a:off x="0" y="0"/>
+          <a:ext cx="0" cy="0"/>
+          <a:chOff x="0" y="0"/>
+          <a:chExt cx="0" cy="0"/>
+        </a:xfrm>
+      </p:grpSpPr>
+      <p:sp>
+        <p:nvSpPr>
+          <p:cNvPr id="2" name="Title 1"/>
+          <p:cNvSpPr>
+            <a:spLocks noGrp="1"/>
+          </p:cNvSpPr>
+          <p:nvPr>
+            <p:ph type="title"/>
+          </p:nvPr>
+        </p:nvSpPr>
+        <p:spPr/>
+        <p:txBody>
+          <a:bodyPr/>
+          <a:lstStyle/>
+          <a:p>
+            <a:endParaRPr lang="en-AU" dirty="0"/>
+          </a:p>
+        </p:txBody>
+      </p:sp>
+      <p:sp>
+        <p:nvSpPr>
+          <p:cNvPr id="3" name="Content Placeholder 2"/>
+          <p:cNvSpPr>
+            <a:spLocks noGrp="1"/>
+          </p:cNvSpPr>
+          <p:nvPr>
+            <p:ph idx="1"/>
+          </p:nvPr>
+        </p:nvSpPr>
+        <p:spPr/>
+        <p:txBody>
+          <a:bodyPr/>
+          <a:lstStyle/>
+          <a:p>
+            <a:endParaRPr lang="en-AU"/>
+          </a:p>
+        </p:txBody>
+      </p:sp>
+      <p:pic>
+        <p:nvPicPr>
+          <p:cNvPr id="2051" name="Picture 3"/>
+          <p:cNvPicPr>
+            <a:picLocks noChangeAspect="1" noChangeArrowheads="1"/>
+          </p:cNvPicPr>
+          <p:nvPr/>
+        </p:nvPicPr>
+        <p:blipFill rotWithShape="1">
+          <a:blip r:embed="rId2">
+            <a:extLst>
+              <a:ext uri="{28A0092B-C50C-407E-A947-70E740481C1C}">
+                <a14:useLocalDpi xmlns:a14="http://schemas.microsoft.com/office/drawing/2010/main" val="0"/>
+              </a:ext>
+            </a:extLst>
+          </a:blip>
+          <a:srcRect l="34271" t="14815" r="21146" b="8889"/>
+          <a:stretch/>
+        </p:blipFill>
+        <p:spPr bwMode="auto">
+          <a:xfrm>
+            <a:off x="2051720" y="620688"/>
+            <a:ext cx="5834745" cy="5616624"/>
+          </a:xfrm>
+          <a:prstGeom prst="rect">
+            <a:avLst/>
+          </a:prstGeom>
+          <a:noFill/>
+          <a:ln>
+            <a:noFill/>
+          </a:ln>
+          <a:extLst>
+            <a:ext uri="{909E8E84-426E-40DD-AFC4-6F175D3DCCD1}">
+              <a14:hiddenFill xmlns:a14="http://schemas.microsoft.com/office/drawing/2010/main">
+                <a:solidFill>
+                  <a:schemeClr val="accent1"/>
+                </a:solidFill>
+              </a14:hiddenFill>
+            </a:ext>
+            <a:ext uri="{91240B29-F687-4F45-9708-019B960494DF}">
+              <a14:hiddenLine xmlns:a14="http://schemas.microsoft.com/office/drawing/2010/main" w="9525">
+                <a:solidFill>
+                  <a:schemeClr val="tx1"/>
+                </a:solidFill>
+                <a:miter lim="800000"/>
+                <a:headEnd/>
+                <a:tailEnd/>
+              </a14:hiddenLine>
+            </a:ext>
+          </a:extLst>
+        </p:spPr>
+      </p:pic>
+    </p:spTree>
+    <p:extLst>
+      <p:ext uri="{BB962C8B-B14F-4D97-AF65-F5344CB8AC3E}">
+        <p14:creationId xmlns:p14="http://schemas.microsoft.com/office/powerpoint/2010/main" val="1685516694"/>
+      </p:ext>
+    </p:extLst>
+  </p:cSld>
+  <p:clrMapOvr>
+    <a:masterClrMapping/>
+  </p:clrMapOvr>
+  <p:timing>
+    <p:tnLst>
+      <p:par>
+        <p:cTn id="1" dur="indefinite" restart="never" nodeType="tmRoot"/>
+      </p:par>
+    </p:tnLst>
+  </p:timing>
+</p:sld>
+</file>
+
 <file path=ppt/theme/theme1.xml><?xml version="1.0" encoding="utf-8"?>
 <a:theme xmlns:a="http://schemas.openxmlformats.org/drawingml/2006/main" name="Office Theme">
   <a:themeElements>

</xml_diff>